<commit_message>
Add wiki images By Jisoo
</commit_message>
<xml_diff>
--- a/project guide/project_guide_extra.pptx
+++ b/project guide/project_guide_extra.pptx
@@ -12,6 +12,9 @@
     <p:sldId id="260" r:id="rId6"/>
     <p:sldId id="261" r:id="rId7"/>
     <p:sldId id="262" r:id="rId8"/>
+    <p:sldId id="263" r:id="rId9"/>
+    <p:sldId id="264" r:id="rId10"/>
+    <p:sldId id="265" r:id="rId11"/>
   </p:sldIdLst>
   <p:sldSz cx="12192000" cy="6858000"/>
   <p:notesSz cx="6858000" cy="9144000"/>
@@ -249,7 +252,7 @@
           <a:p>
             <a:fld id="{F3336509-2A3B-4D3F-8348-376B5E297D3D}" type="datetimeFigureOut">
               <a:rPr lang="ko-KR" altLang="en-US" smtClean="0"/>
-              <a:t>2019-11-01</a:t>
+              <a:t>2019-11-23</a:t>
             </a:fld>
             <a:endParaRPr lang="ko-KR" altLang="en-US"/>
           </a:p>
@@ -419,7 +422,7 @@
           <a:p>
             <a:fld id="{F3336509-2A3B-4D3F-8348-376B5E297D3D}" type="datetimeFigureOut">
               <a:rPr lang="ko-KR" altLang="en-US" smtClean="0"/>
-              <a:t>2019-11-01</a:t>
+              <a:t>2019-11-23</a:t>
             </a:fld>
             <a:endParaRPr lang="ko-KR" altLang="en-US"/>
           </a:p>
@@ -599,7 +602,7 @@
           <a:p>
             <a:fld id="{F3336509-2A3B-4D3F-8348-376B5E297D3D}" type="datetimeFigureOut">
               <a:rPr lang="ko-KR" altLang="en-US" smtClean="0"/>
-              <a:t>2019-11-01</a:t>
+              <a:t>2019-11-23</a:t>
             </a:fld>
             <a:endParaRPr lang="ko-KR" altLang="en-US"/>
           </a:p>
@@ -769,7 +772,7 @@
           <a:p>
             <a:fld id="{F3336509-2A3B-4D3F-8348-376B5E297D3D}" type="datetimeFigureOut">
               <a:rPr lang="ko-KR" altLang="en-US" smtClean="0"/>
-              <a:t>2019-11-01</a:t>
+              <a:t>2019-11-23</a:t>
             </a:fld>
             <a:endParaRPr lang="ko-KR" altLang="en-US"/>
           </a:p>
@@ -1015,7 +1018,7 @@
           <a:p>
             <a:fld id="{F3336509-2A3B-4D3F-8348-376B5E297D3D}" type="datetimeFigureOut">
               <a:rPr lang="ko-KR" altLang="en-US" smtClean="0"/>
-              <a:t>2019-11-01</a:t>
+              <a:t>2019-11-23</a:t>
             </a:fld>
             <a:endParaRPr lang="ko-KR" altLang="en-US"/>
           </a:p>
@@ -1247,7 +1250,7 @@
           <a:p>
             <a:fld id="{F3336509-2A3B-4D3F-8348-376B5E297D3D}" type="datetimeFigureOut">
               <a:rPr lang="ko-KR" altLang="en-US" smtClean="0"/>
-              <a:t>2019-11-01</a:t>
+              <a:t>2019-11-23</a:t>
             </a:fld>
             <a:endParaRPr lang="ko-KR" altLang="en-US"/>
           </a:p>
@@ -1614,7 +1617,7 @@
           <a:p>
             <a:fld id="{F3336509-2A3B-4D3F-8348-376B5E297D3D}" type="datetimeFigureOut">
               <a:rPr lang="ko-KR" altLang="en-US" smtClean="0"/>
-              <a:t>2019-11-01</a:t>
+              <a:t>2019-11-23</a:t>
             </a:fld>
             <a:endParaRPr lang="ko-KR" altLang="en-US"/>
           </a:p>
@@ -1732,7 +1735,7 @@
           <a:p>
             <a:fld id="{F3336509-2A3B-4D3F-8348-376B5E297D3D}" type="datetimeFigureOut">
               <a:rPr lang="ko-KR" altLang="en-US" smtClean="0"/>
-              <a:t>2019-11-01</a:t>
+              <a:t>2019-11-23</a:t>
             </a:fld>
             <a:endParaRPr lang="ko-KR" altLang="en-US"/>
           </a:p>
@@ -1827,7 +1830,7 @@
           <a:p>
             <a:fld id="{F3336509-2A3B-4D3F-8348-376B5E297D3D}" type="datetimeFigureOut">
               <a:rPr lang="ko-KR" altLang="en-US" smtClean="0"/>
-              <a:t>2019-11-01</a:t>
+              <a:t>2019-11-23</a:t>
             </a:fld>
             <a:endParaRPr lang="ko-KR" altLang="en-US"/>
           </a:p>
@@ -2104,7 +2107,7 @@
           <a:p>
             <a:fld id="{F3336509-2A3B-4D3F-8348-376B5E297D3D}" type="datetimeFigureOut">
               <a:rPr lang="ko-KR" altLang="en-US" smtClean="0"/>
-              <a:t>2019-11-01</a:t>
+              <a:t>2019-11-23</a:t>
             </a:fld>
             <a:endParaRPr lang="ko-KR" altLang="en-US"/>
           </a:p>
@@ -2357,7 +2360,7 @@
           <a:p>
             <a:fld id="{F3336509-2A3B-4D3F-8348-376B5E297D3D}" type="datetimeFigureOut">
               <a:rPr lang="ko-KR" altLang="en-US" smtClean="0"/>
-              <a:t>2019-11-01</a:t>
+              <a:t>2019-11-23</a:t>
             </a:fld>
             <a:endParaRPr lang="ko-KR" altLang="en-US"/>
           </a:p>
@@ -2570,7 +2573,7 @@
           <a:p>
             <a:fld id="{F3336509-2A3B-4D3F-8348-376B5E297D3D}" type="datetimeFigureOut">
               <a:rPr lang="ko-KR" altLang="en-US" smtClean="0"/>
-              <a:t>2019-11-01</a:t>
+              <a:t>2019-11-23</a:t>
             </a:fld>
             <a:endParaRPr lang="ko-KR" altLang="en-US"/>
           </a:p>
@@ -3017,6 +3020,504 @@
     <p:extLst>
       <p:ext uri="{BB962C8B-B14F-4D97-AF65-F5344CB8AC3E}">
         <p14:creationId xmlns:p14="http://schemas.microsoft.com/office/powerpoint/2010/main" val="170389503"/>
+      </p:ext>
+    </p:extLst>
+  </p:cSld>
+  <p:clrMapOvr>
+    <a:masterClrMapping/>
+  </p:clrMapOvr>
+</p:sld>
+</file>
+
+<file path=ppt/slides/slide10.xml><?xml version="1.0" encoding="utf-8"?>
+<p:sld xmlns:a="http://schemas.openxmlformats.org/drawingml/2006/main" xmlns:r="http://schemas.openxmlformats.org/officeDocument/2006/relationships" xmlns:p="http://schemas.openxmlformats.org/presentationml/2006/main">
+  <p:cSld>
+    <p:spTree>
+      <p:nvGrpSpPr>
+        <p:cNvPr id="1" name=""/>
+        <p:cNvGrpSpPr/>
+        <p:nvPr/>
+      </p:nvGrpSpPr>
+      <p:grpSpPr>
+        <a:xfrm>
+          <a:off x="0" y="0"/>
+          <a:ext cx="0" cy="0"/>
+          <a:chOff x="0" y="0"/>
+          <a:chExt cx="0" cy="0"/>
+        </a:xfrm>
+      </p:grpSpPr>
+      <p:sp>
+        <p:nvSpPr>
+          <p:cNvPr id="2" name="직사각형 1"/>
+          <p:cNvSpPr/>
+          <p:nvPr/>
+        </p:nvSpPr>
+        <p:spPr>
+          <a:xfrm>
+            <a:off x="1121792" y="2356700"/>
+            <a:ext cx="9737886" cy="4015820"/>
+          </a:xfrm>
+          <a:prstGeom prst="rect">
+            <a:avLst/>
+          </a:prstGeom>
+          <a:noFill/>
+          <a:ln>
+            <a:solidFill>
+              <a:schemeClr val="tx1"/>
+            </a:solidFill>
+          </a:ln>
+        </p:spPr>
+        <p:style>
+          <a:lnRef idx="2">
+            <a:schemeClr val="accent1">
+              <a:shade val="50000"/>
+            </a:schemeClr>
+          </a:lnRef>
+          <a:fillRef idx="1">
+            <a:schemeClr val="accent1"/>
+          </a:fillRef>
+          <a:effectRef idx="0">
+            <a:schemeClr val="accent1"/>
+          </a:effectRef>
+          <a:fontRef idx="minor">
+            <a:schemeClr val="lt1"/>
+          </a:fontRef>
+        </p:style>
+        <p:txBody>
+          <a:bodyPr rtlCol="0" anchor="ctr"/>
+          <a:lstStyle/>
+          <a:p>
+            <a:pPr algn="ctr"/>
+            <a:r>
+              <a:rPr lang="en-US" altLang="ko-KR" sz="6000" dirty="0" smtClean="0">
+                <a:solidFill>
+                  <a:schemeClr val="tx1"/>
+                </a:solidFill>
+              </a:rPr>
+              <a:t>[</a:t>
+            </a:r>
+            <a:r>
+              <a:rPr lang="en-US" altLang="ko-KR" sz="3600" dirty="0" smtClean="0">
+                <a:solidFill>
+                  <a:schemeClr val="tx1"/>
+                </a:solidFill>
+              </a:rPr>
+              <a:t>[ 1, 0, 1, 1, 0, </a:t>
+            </a:r>
+            <a:r>
+              <a:rPr lang="en-US" altLang="ko-KR" sz="3600" dirty="0">
+                <a:solidFill>
+                  <a:schemeClr val="tx1"/>
+                </a:solidFill>
+              </a:rPr>
+              <a:t>0, 1, 1, 0</a:t>
+            </a:r>
+            <a:r>
+              <a:rPr lang="en-US" altLang="ko-KR" sz="3600" dirty="0" smtClean="0">
+                <a:solidFill>
+                  <a:schemeClr val="tx1"/>
+                </a:solidFill>
+              </a:rPr>
+              <a:t>],</a:t>
+            </a:r>
+          </a:p>
+          <a:p>
+            <a:pPr algn="ctr"/>
+            <a:r>
+              <a:rPr lang="en-US" altLang="ko-KR" sz="3600" dirty="0" smtClean="0">
+                <a:solidFill>
+                  <a:schemeClr val="tx1"/>
+                </a:solidFill>
+              </a:rPr>
+              <a:t> [ 3, 0, 1, 1, 1, 1, 1, 1, 0],</a:t>
+            </a:r>
+          </a:p>
+          <a:p>
+            <a:pPr algn="ctr"/>
+            <a:r>
+              <a:rPr lang="en-US" altLang="ko-KR" sz="3600" dirty="0">
+                <a:solidFill>
+                  <a:schemeClr val="tx1"/>
+                </a:solidFill>
+              </a:rPr>
+              <a:t> </a:t>
+            </a:r>
+            <a:r>
+              <a:rPr lang="en-US" altLang="ko-KR" sz="3600" dirty="0" smtClean="0">
+                <a:solidFill>
+                  <a:schemeClr val="tx1"/>
+                </a:solidFill>
+              </a:rPr>
+              <a:t>[ 4, </a:t>
+            </a:r>
+            <a:r>
+              <a:rPr lang="en-US" altLang="ko-KR" sz="3600" dirty="0">
+                <a:solidFill>
+                  <a:schemeClr val="tx1"/>
+                </a:solidFill>
+              </a:rPr>
+              <a:t>0, 1, 1, </a:t>
+            </a:r>
+            <a:r>
+              <a:rPr lang="en-US" altLang="ko-KR" sz="3600" dirty="0" smtClean="0">
+                <a:solidFill>
+                  <a:schemeClr val="tx1"/>
+                </a:solidFill>
+              </a:rPr>
+              <a:t>0, 0, 1, 1, 0],</a:t>
+            </a:r>
+          </a:p>
+          <a:p>
+            <a:pPr algn="ctr"/>
+            <a:r>
+              <a:rPr lang="en-US" altLang="ko-KR" sz="3600" dirty="0">
+                <a:solidFill>
+                  <a:schemeClr val="tx1"/>
+                </a:solidFill>
+              </a:rPr>
+              <a:t> </a:t>
+            </a:r>
+            <a:r>
+              <a:rPr lang="en-US" altLang="ko-KR" sz="3600" dirty="0" smtClean="0">
+                <a:solidFill>
+                  <a:schemeClr val="tx1"/>
+                </a:solidFill>
+              </a:rPr>
+              <a:t>[ 5, 1, </a:t>
+            </a:r>
+            <a:r>
+              <a:rPr lang="en-US" altLang="ko-KR" sz="3600" dirty="0">
+                <a:solidFill>
+                  <a:schemeClr val="tx1"/>
+                </a:solidFill>
+              </a:rPr>
+              <a:t>1, 1, </a:t>
+            </a:r>
+            <a:r>
+              <a:rPr lang="en-US" altLang="ko-KR" sz="3600" dirty="0" smtClean="0">
+                <a:solidFill>
+                  <a:schemeClr val="tx1"/>
+                </a:solidFill>
+              </a:rPr>
+              <a:t>1, 1, 1, 1, 1],</a:t>
+            </a:r>
+          </a:p>
+          <a:p>
+            <a:pPr algn="ctr"/>
+            <a:r>
+              <a:rPr lang="en-US" altLang="ko-KR" sz="3600" dirty="0">
+                <a:solidFill>
+                  <a:schemeClr val="tx1"/>
+                </a:solidFill>
+              </a:rPr>
+              <a:t> </a:t>
+            </a:r>
+            <a:r>
+              <a:rPr lang="en-US" altLang="ko-KR" sz="3600" dirty="0" smtClean="0">
+                <a:solidFill>
+                  <a:schemeClr val="tx1"/>
+                </a:solidFill>
+              </a:rPr>
+              <a:t>[ 10, 1, 0, 1, 0, 0, 1, 0, 1]</a:t>
+            </a:r>
+            <a:r>
+              <a:rPr lang="en-US" altLang="ko-KR" sz="6600" dirty="0" smtClean="0">
+                <a:solidFill>
+                  <a:schemeClr val="tx1"/>
+                </a:solidFill>
+              </a:rPr>
+              <a:t>]</a:t>
+            </a:r>
+            <a:endParaRPr lang="ko-KR" altLang="en-US" sz="6600" dirty="0">
+              <a:solidFill>
+                <a:schemeClr val="tx1"/>
+              </a:solidFill>
+            </a:endParaRPr>
+          </a:p>
+        </p:txBody>
+      </p:sp>
+      <p:sp>
+        <p:nvSpPr>
+          <p:cNvPr id="3" name="직사각형 2"/>
+          <p:cNvSpPr/>
+          <p:nvPr/>
+        </p:nvSpPr>
+        <p:spPr>
+          <a:xfrm>
+            <a:off x="3676453" y="2903458"/>
+            <a:ext cx="735291" cy="3271100"/>
+          </a:xfrm>
+          <a:prstGeom prst="rect">
+            <a:avLst/>
+          </a:prstGeom>
+          <a:noFill/>
+          <a:ln w="28575">
+            <a:solidFill>
+              <a:srgbClr val="FF0000"/>
+            </a:solidFill>
+          </a:ln>
+        </p:spPr>
+        <p:style>
+          <a:lnRef idx="2">
+            <a:schemeClr val="accent1">
+              <a:shade val="50000"/>
+            </a:schemeClr>
+          </a:lnRef>
+          <a:fillRef idx="1">
+            <a:schemeClr val="accent1"/>
+          </a:fillRef>
+          <a:effectRef idx="0">
+            <a:schemeClr val="accent1"/>
+          </a:effectRef>
+          <a:fontRef idx="minor">
+            <a:schemeClr val="lt1"/>
+          </a:fontRef>
+        </p:style>
+        <p:txBody>
+          <a:bodyPr rtlCol="0" anchor="ctr"/>
+          <a:lstStyle/>
+          <a:p>
+            <a:pPr algn="ctr"/>
+            <a:endParaRPr lang="ko-KR" altLang="en-US"/>
+          </a:p>
+        </p:txBody>
+      </p:sp>
+      <p:sp>
+        <p:nvSpPr>
+          <p:cNvPr id="4" name="직사각형 3"/>
+          <p:cNvSpPr/>
+          <p:nvPr/>
+        </p:nvSpPr>
+        <p:spPr>
+          <a:xfrm>
+            <a:off x="4411744" y="2799762"/>
+            <a:ext cx="4289195" cy="697582"/>
+          </a:xfrm>
+          <a:prstGeom prst="rect">
+            <a:avLst/>
+          </a:prstGeom>
+          <a:noFill/>
+          <a:ln w="28575">
+            <a:solidFill>
+              <a:srgbClr val="00B0F0"/>
+            </a:solidFill>
+          </a:ln>
+        </p:spPr>
+        <p:style>
+          <a:lnRef idx="2">
+            <a:schemeClr val="accent1">
+              <a:shade val="50000"/>
+            </a:schemeClr>
+          </a:lnRef>
+          <a:fillRef idx="1">
+            <a:schemeClr val="accent1"/>
+          </a:fillRef>
+          <a:effectRef idx="0">
+            <a:schemeClr val="accent1"/>
+          </a:effectRef>
+          <a:fontRef idx="minor">
+            <a:schemeClr val="lt1"/>
+          </a:fontRef>
+        </p:style>
+        <p:txBody>
+          <a:bodyPr rtlCol="0" anchor="ctr"/>
+          <a:lstStyle/>
+          <a:p>
+            <a:pPr algn="ctr"/>
+            <a:endParaRPr lang="ko-KR" altLang="en-US"/>
+          </a:p>
+        </p:txBody>
+      </p:sp>
+      <p:sp>
+        <p:nvSpPr>
+          <p:cNvPr id="5" name="설명선 1 4"/>
+          <p:cNvSpPr/>
+          <p:nvPr/>
+        </p:nvSpPr>
+        <p:spPr>
+          <a:xfrm>
+            <a:off x="8102338" y="1729818"/>
+            <a:ext cx="1776952" cy="848413"/>
+          </a:xfrm>
+          <a:prstGeom prst="borderCallout1">
+            <a:avLst>
+              <a:gd name="adj1" fmla="val 54287"/>
+              <a:gd name="adj2" fmla="val 10470"/>
+              <a:gd name="adj3" fmla="val 112500"/>
+              <a:gd name="adj4" fmla="val -38333"/>
+            </a:avLst>
+          </a:prstGeom>
+        </p:spPr>
+        <p:style>
+          <a:lnRef idx="2">
+            <a:schemeClr val="accent1">
+              <a:shade val="50000"/>
+            </a:schemeClr>
+          </a:lnRef>
+          <a:fillRef idx="1">
+            <a:schemeClr val="accent1"/>
+          </a:fillRef>
+          <a:effectRef idx="0">
+            <a:schemeClr val="accent1"/>
+          </a:effectRef>
+          <a:fontRef idx="minor">
+            <a:schemeClr val="lt1"/>
+          </a:fontRef>
+        </p:style>
+        <p:txBody>
+          <a:bodyPr rtlCol="0" anchor="ctr"/>
+          <a:lstStyle/>
+          <a:p>
+            <a:pPr algn="ctr"/>
+            <a:r>
+              <a:rPr lang="ko-KR" altLang="en-US" dirty="0" smtClean="0"/>
+              <a:t>손가락 위치</a:t>
+            </a:r>
+            <a:endParaRPr lang="ko-KR" altLang="en-US" dirty="0"/>
+          </a:p>
+        </p:txBody>
+      </p:sp>
+      <p:sp>
+        <p:nvSpPr>
+          <p:cNvPr id="6" name="설명선 1 5"/>
+          <p:cNvSpPr/>
+          <p:nvPr/>
+        </p:nvSpPr>
+        <p:spPr>
+          <a:xfrm>
+            <a:off x="2611227" y="1397521"/>
+            <a:ext cx="2582942" cy="848413"/>
+          </a:xfrm>
+          <a:prstGeom prst="borderCallout1">
+            <a:avLst>
+              <a:gd name="adj1" fmla="val 106509"/>
+              <a:gd name="adj2" fmla="val 50258"/>
+              <a:gd name="adj3" fmla="val 161389"/>
+              <a:gd name="adj4" fmla="val 57157"/>
+            </a:avLst>
+          </a:prstGeom>
+        </p:spPr>
+        <p:style>
+          <a:lnRef idx="2">
+            <a:schemeClr val="accent1">
+              <a:shade val="50000"/>
+            </a:schemeClr>
+          </a:lnRef>
+          <a:fillRef idx="1">
+            <a:schemeClr val="accent1"/>
+          </a:fillRef>
+          <a:effectRef idx="0">
+            <a:schemeClr val="accent1"/>
+          </a:effectRef>
+          <a:fontRef idx="minor">
+            <a:schemeClr val="lt1"/>
+          </a:fontRef>
+        </p:style>
+        <p:txBody>
+          <a:bodyPr rtlCol="0" anchor="ctr"/>
+          <a:lstStyle/>
+          <a:p>
+            <a:pPr algn="ctr"/>
+            <a:r>
+              <a:rPr lang="en-US" altLang="ko-KR" dirty="0" smtClean="0"/>
+              <a:t>Note </a:t>
+            </a:r>
+            <a:r>
+              <a:rPr lang="ko-KR" altLang="en-US" dirty="0" smtClean="0"/>
+              <a:t>떨어지는 시간</a:t>
+            </a:r>
+            <a:r>
+              <a:rPr lang="en-US" altLang="ko-KR" dirty="0" smtClean="0"/>
+              <a:t>(</a:t>
+            </a:r>
+            <a:r>
+              <a:rPr lang="ko-KR" altLang="en-US" dirty="0" smtClean="0"/>
+              <a:t>초</a:t>
+            </a:r>
+            <a:r>
+              <a:rPr lang="en-US" altLang="ko-KR" dirty="0" smtClean="0"/>
+              <a:t>)</a:t>
+            </a:r>
+            <a:endParaRPr lang="ko-KR" altLang="en-US" dirty="0"/>
+          </a:p>
+        </p:txBody>
+      </p:sp>
+      <p:sp>
+        <p:nvSpPr>
+          <p:cNvPr id="7" name="직사각형 6"/>
+          <p:cNvSpPr/>
+          <p:nvPr/>
+        </p:nvSpPr>
+        <p:spPr>
+          <a:xfrm>
+            <a:off x="292232" y="424202"/>
+            <a:ext cx="5618376" cy="678730"/>
+          </a:xfrm>
+          <a:prstGeom prst="rect">
+            <a:avLst/>
+          </a:prstGeom>
+        </p:spPr>
+        <p:style>
+          <a:lnRef idx="2">
+            <a:schemeClr val="dk1">
+              <a:shade val="50000"/>
+            </a:schemeClr>
+          </a:lnRef>
+          <a:fillRef idx="1">
+            <a:schemeClr val="dk1"/>
+          </a:fillRef>
+          <a:effectRef idx="0">
+            <a:schemeClr val="dk1"/>
+          </a:effectRef>
+          <a:fontRef idx="minor">
+            <a:schemeClr val="lt1"/>
+          </a:fontRef>
+        </p:style>
+        <p:txBody>
+          <a:bodyPr rtlCol="0" anchor="ctr"/>
+          <a:lstStyle/>
+          <a:p>
+            <a:pPr algn="ctr"/>
+            <a:r>
+              <a:rPr lang="ko-KR" altLang="en-US" dirty="0" smtClean="0"/>
+              <a:t>결과물</a:t>
+            </a:r>
+            <a:r>
+              <a:rPr lang="en-US" altLang="ko-KR" dirty="0" smtClean="0"/>
+              <a:t>2 – </a:t>
+            </a:r>
+            <a:r>
+              <a:rPr lang="ko-KR" altLang="en-US" dirty="0" smtClean="0"/>
+              <a:t>별이 빛나는 밤에</a:t>
+            </a:r>
+            <a:r>
+              <a:rPr lang="en-US" altLang="ko-KR" dirty="0" smtClean="0"/>
+              <a:t>/30</a:t>
+            </a:r>
+            <a:r>
+              <a:rPr lang="ko-KR" altLang="en-US" dirty="0" smtClean="0"/>
+              <a:t>초</a:t>
+            </a:r>
+            <a:r>
+              <a:rPr lang="en-US" altLang="ko-KR" dirty="0" smtClean="0"/>
+              <a:t>/</a:t>
+            </a:r>
+            <a:r>
+              <a:rPr lang="ko-KR" altLang="en-US" dirty="0" smtClean="0"/>
+              <a:t>난이도 상</a:t>
+            </a:r>
+            <a:r>
+              <a:rPr lang="en-US" altLang="ko-KR" dirty="0" smtClean="0"/>
+              <a:t>(key 8)</a:t>
+            </a:r>
+            <a:endParaRPr lang="ko-KR" altLang="en-US" dirty="0"/>
+          </a:p>
+        </p:txBody>
+      </p:sp>
+    </p:spTree>
+    <p:extLst>
+      <p:ext uri="{BB962C8B-B14F-4D97-AF65-F5344CB8AC3E}">
+        <p14:creationId xmlns:p14="http://schemas.microsoft.com/office/powerpoint/2010/main" val="975857500"/>
       </p:ext>
     </p:extLst>
   </p:cSld>
@@ -8678,6 +9179,1015 @@
 </p:sld>
 </file>
 
+<file path=ppt/slides/slide8.xml><?xml version="1.0" encoding="utf-8"?>
+<p:sld xmlns:a="http://schemas.openxmlformats.org/drawingml/2006/main" xmlns:r="http://schemas.openxmlformats.org/officeDocument/2006/relationships" xmlns:p="http://schemas.openxmlformats.org/presentationml/2006/main">
+  <p:cSld>
+    <p:spTree>
+      <p:nvGrpSpPr>
+        <p:cNvPr id="1" name=""/>
+        <p:cNvGrpSpPr/>
+        <p:nvPr/>
+      </p:nvGrpSpPr>
+      <p:grpSpPr>
+        <a:xfrm>
+          <a:off x="0" y="0"/>
+          <a:ext cx="0" cy="0"/>
+          <a:chOff x="0" y="0"/>
+          <a:chExt cx="0" cy="0"/>
+        </a:xfrm>
+      </p:grpSpPr>
+      <p:sp>
+        <p:nvSpPr>
+          <p:cNvPr id="2" name="직사각형 1"/>
+          <p:cNvSpPr/>
+          <p:nvPr/>
+        </p:nvSpPr>
+        <p:spPr>
+          <a:xfrm>
+            <a:off x="1357459" y="725863"/>
+            <a:ext cx="9455085" cy="5448693"/>
+          </a:xfrm>
+          <a:prstGeom prst="rect">
+            <a:avLst/>
+          </a:prstGeom>
+          <a:noFill/>
+          <a:ln>
+            <a:solidFill>
+              <a:schemeClr val="tx1"/>
+            </a:solidFill>
+          </a:ln>
+        </p:spPr>
+        <p:style>
+          <a:lnRef idx="2">
+            <a:schemeClr val="accent1">
+              <a:shade val="50000"/>
+            </a:schemeClr>
+          </a:lnRef>
+          <a:fillRef idx="1">
+            <a:schemeClr val="accent1"/>
+          </a:fillRef>
+          <a:effectRef idx="0">
+            <a:schemeClr val="accent1"/>
+          </a:effectRef>
+          <a:fontRef idx="minor">
+            <a:schemeClr val="lt1"/>
+          </a:fontRef>
+        </p:style>
+        <p:txBody>
+          <a:bodyPr rtlCol="0" anchor="ctr"/>
+          <a:lstStyle/>
+          <a:p>
+            <a:pPr algn="ctr"/>
+            <a:endParaRPr lang="ko-KR" altLang="en-US"/>
+          </a:p>
+        </p:txBody>
+      </p:sp>
+      <p:sp>
+        <p:nvSpPr>
+          <p:cNvPr id="3" name="직사각형 2"/>
+          <p:cNvSpPr/>
+          <p:nvPr/>
+        </p:nvSpPr>
+        <p:spPr>
+          <a:xfrm>
+            <a:off x="1857081" y="2865748"/>
+            <a:ext cx="1781666" cy="2413262"/>
+          </a:xfrm>
+          <a:prstGeom prst="rect">
+            <a:avLst/>
+          </a:prstGeom>
+          <a:noFill/>
+          <a:ln>
+            <a:solidFill>
+              <a:schemeClr val="tx1"/>
+            </a:solidFill>
+          </a:ln>
+        </p:spPr>
+        <p:style>
+          <a:lnRef idx="2">
+            <a:schemeClr val="accent1">
+              <a:shade val="50000"/>
+            </a:schemeClr>
+          </a:lnRef>
+          <a:fillRef idx="1">
+            <a:schemeClr val="accent1"/>
+          </a:fillRef>
+          <a:effectRef idx="0">
+            <a:schemeClr val="accent1"/>
+          </a:effectRef>
+          <a:fontRef idx="minor">
+            <a:schemeClr val="lt1"/>
+          </a:fontRef>
+        </p:style>
+        <p:txBody>
+          <a:bodyPr rtlCol="0" anchor="ctr"/>
+          <a:lstStyle/>
+          <a:p>
+            <a:pPr algn="ctr"/>
+            <a:endParaRPr lang="ko-KR" altLang="en-US"/>
+          </a:p>
+        </p:txBody>
+      </p:sp>
+      <p:sp>
+        <p:nvSpPr>
+          <p:cNvPr id="4" name="직사각형 3"/>
+          <p:cNvSpPr/>
+          <p:nvPr/>
+        </p:nvSpPr>
+        <p:spPr>
+          <a:xfrm>
+            <a:off x="4138369" y="1272618"/>
+            <a:ext cx="3959257" cy="3930978"/>
+          </a:xfrm>
+          <a:prstGeom prst="rect">
+            <a:avLst/>
+          </a:prstGeom>
+          <a:noFill/>
+          <a:ln>
+            <a:solidFill>
+              <a:schemeClr val="tx1"/>
+            </a:solidFill>
+          </a:ln>
+        </p:spPr>
+        <p:style>
+          <a:lnRef idx="2">
+            <a:schemeClr val="accent1">
+              <a:shade val="50000"/>
+            </a:schemeClr>
+          </a:lnRef>
+          <a:fillRef idx="1">
+            <a:schemeClr val="accent1"/>
+          </a:fillRef>
+          <a:effectRef idx="0">
+            <a:schemeClr val="accent1"/>
+          </a:effectRef>
+          <a:fontRef idx="minor">
+            <a:schemeClr val="lt1"/>
+          </a:fontRef>
+        </p:style>
+        <p:txBody>
+          <a:bodyPr rtlCol="0" anchor="ctr"/>
+          <a:lstStyle/>
+          <a:p>
+            <a:pPr algn="ctr"/>
+            <a:endParaRPr lang="ko-KR" altLang="en-US"/>
+          </a:p>
+        </p:txBody>
+      </p:sp>
+      <p:sp>
+        <p:nvSpPr>
+          <p:cNvPr id="5" name="직사각형 4"/>
+          <p:cNvSpPr/>
+          <p:nvPr/>
+        </p:nvSpPr>
+        <p:spPr>
+          <a:xfrm>
+            <a:off x="8597248" y="2865748"/>
+            <a:ext cx="1781666" cy="2337848"/>
+          </a:xfrm>
+          <a:prstGeom prst="rect">
+            <a:avLst/>
+          </a:prstGeom>
+          <a:noFill/>
+          <a:ln>
+            <a:solidFill>
+              <a:schemeClr val="tx1"/>
+            </a:solidFill>
+          </a:ln>
+        </p:spPr>
+        <p:style>
+          <a:lnRef idx="2">
+            <a:schemeClr val="accent1">
+              <a:shade val="50000"/>
+            </a:schemeClr>
+          </a:lnRef>
+          <a:fillRef idx="1">
+            <a:schemeClr val="accent1"/>
+          </a:fillRef>
+          <a:effectRef idx="0">
+            <a:schemeClr val="accent1"/>
+          </a:effectRef>
+          <a:fontRef idx="minor">
+            <a:schemeClr val="lt1"/>
+          </a:fontRef>
+        </p:style>
+        <p:txBody>
+          <a:bodyPr rtlCol="0" anchor="ctr"/>
+          <a:lstStyle/>
+          <a:p>
+            <a:pPr algn="ctr"/>
+            <a:endParaRPr lang="ko-KR" altLang="en-US"/>
+          </a:p>
+        </p:txBody>
+      </p:sp>
+      <p:sp>
+        <p:nvSpPr>
+          <p:cNvPr id="6" name="설명선 1 5"/>
+          <p:cNvSpPr/>
+          <p:nvPr/>
+        </p:nvSpPr>
+        <p:spPr>
+          <a:xfrm>
+            <a:off x="1857081" y="1894788"/>
+            <a:ext cx="1781666" cy="414780"/>
+          </a:xfrm>
+          <a:prstGeom prst="borderCallout1">
+            <a:avLst>
+              <a:gd name="adj1" fmla="val 107387"/>
+              <a:gd name="adj2" fmla="val 40083"/>
+              <a:gd name="adj3" fmla="val 212500"/>
+              <a:gd name="adj4" fmla="val 38913"/>
+            </a:avLst>
+          </a:prstGeom>
+        </p:spPr>
+        <p:style>
+          <a:lnRef idx="2">
+            <a:schemeClr val="accent1">
+              <a:shade val="50000"/>
+            </a:schemeClr>
+          </a:lnRef>
+          <a:fillRef idx="1">
+            <a:schemeClr val="accent1"/>
+          </a:fillRef>
+          <a:effectRef idx="0">
+            <a:schemeClr val="accent1"/>
+          </a:effectRef>
+          <a:fontRef idx="minor">
+            <a:schemeClr val="lt1"/>
+          </a:fontRef>
+        </p:style>
+        <p:txBody>
+          <a:bodyPr rtlCol="0" anchor="ctr"/>
+          <a:lstStyle/>
+          <a:p>
+            <a:pPr algn="ctr"/>
+            <a:r>
+              <a:rPr lang="en-US" altLang="ko-KR" dirty="0" err="1" smtClean="0"/>
+              <a:t>socre_div</a:t>
+            </a:r>
+            <a:endParaRPr lang="ko-KR" altLang="en-US" dirty="0"/>
+          </a:p>
+        </p:txBody>
+      </p:sp>
+      <p:sp>
+        <p:nvSpPr>
+          <p:cNvPr id="7" name="설명선 1 6"/>
+          <p:cNvSpPr/>
+          <p:nvPr/>
+        </p:nvSpPr>
+        <p:spPr>
+          <a:xfrm>
+            <a:off x="5227164" y="377071"/>
+            <a:ext cx="1781666" cy="414780"/>
+          </a:xfrm>
+          <a:prstGeom prst="borderCallout1">
+            <a:avLst>
+              <a:gd name="adj1" fmla="val 107387"/>
+              <a:gd name="adj2" fmla="val 40083"/>
+              <a:gd name="adj3" fmla="val 212500"/>
+              <a:gd name="adj4" fmla="val 38913"/>
+            </a:avLst>
+          </a:prstGeom>
+        </p:spPr>
+        <p:style>
+          <a:lnRef idx="2">
+            <a:schemeClr val="accent1">
+              <a:shade val="50000"/>
+            </a:schemeClr>
+          </a:lnRef>
+          <a:fillRef idx="1">
+            <a:schemeClr val="accent1"/>
+          </a:fillRef>
+          <a:effectRef idx="0">
+            <a:schemeClr val="accent1"/>
+          </a:effectRef>
+          <a:fontRef idx="minor">
+            <a:schemeClr val="lt1"/>
+          </a:fontRef>
+        </p:style>
+        <p:txBody>
+          <a:bodyPr rtlCol="0" anchor="ctr"/>
+          <a:lstStyle/>
+          <a:p>
+            <a:pPr algn="ctr"/>
+            <a:r>
+              <a:rPr lang="en-US" altLang="ko-KR" dirty="0" err="1" smtClean="0"/>
+              <a:t>note_div</a:t>
+            </a:r>
+            <a:endParaRPr lang="ko-KR" altLang="en-US" dirty="0"/>
+          </a:p>
+        </p:txBody>
+      </p:sp>
+      <p:sp>
+        <p:nvSpPr>
+          <p:cNvPr id="8" name="설명선 1 7"/>
+          <p:cNvSpPr/>
+          <p:nvPr/>
+        </p:nvSpPr>
+        <p:spPr>
+          <a:xfrm>
+            <a:off x="8597248" y="2055043"/>
+            <a:ext cx="1781666" cy="414780"/>
+          </a:xfrm>
+          <a:prstGeom prst="borderCallout1">
+            <a:avLst>
+              <a:gd name="adj1" fmla="val 107387"/>
+              <a:gd name="adj2" fmla="val 40083"/>
+              <a:gd name="adj3" fmla="val 212500"/>
+              <a:gd name="adj4" fmla="val 38913"/>
+            </a:avLst>
+          </a:prstGeom>
+        </p:spPr>
+        <p:style>
+          <a:lnRef idx="2">
+            <a:schemeClr val="accent1">
+              <a:shade val="50000"/>
+            </a:schemeClr>
+          </a:lnRef>
+          <a:fillRef idx="1">
+            <a:schemeClr val="accent1"/>
+          </a:fillRef>
+          <a:effectRef idx="0">
+            <a:schemeClr val="accent1"/>
+          </a:effectRef>
+          <a:fontRef idx="minor">
+            <a:schemeClr val="lt1"/>
+          </a:fontRef>
+        </p:style>
+        <p:txBody>
+          <a:bodyPr rtlCol="0" anchor="ctr"/>
+          <a:lstStyle/>
+          <a:p>
+            <a:pPr algn="ctr"/>
+            <a:r>
+              <a:rPr lang="en-US" altLang="ko-KR" dirty="0" err="1" smtClean="0"/>
+              <a:t>life_div</a:t>
+            </a:r>
+            <a:endParaRPr lang="ko-KR" altLang="en-US" dirty="0"/>
+          </a:p>
+        </p:txBody>
+      </p:sp>
+      <p:sp>
+        <p:nvSpPr>
+          <p:cNvPr id="9" name="직사각형 8"/>
+          <p:cNvSpPr/>
+          <p:nvPr/>
+        </p:nvSpPr>
+        <p:spPr>
+          <a:xfrm>
+            <a:off x="4114803" y="5467546"/>
+            <a:ext cx="4044097" cy="433633"/>
+          </a:xfrm>
+          <a:prstGeom prst="rect">
+            <a:avLst/>
+          </a:prstGeom>
+          <a:noFill/>
+          <a:ln>
+            <a:solidFill>
+              <a:schemeClr val="tx1"/>
+            </a:solidFill>
+          </a:ln>
+        </p:spPr>
+        <p:style>
+          <a:lnRef idx="2">
+            <a:schemeClr val="accent1">
+              <a:shade val="50000"/>
+            </a:schemeClr>
+          </a:lnRef>
+          <a:fillRef idx="1">
+            <a:schemeClr val="accent1"/>
+          </a:fillRef>
+          <a:effectRef idx="0">
+            <a:schemeClr val="accent1"/>
+          </a:effectRef>
+          <a:fontRef idx="minor">
+            <a:schemeClr val="lt1"/>
+          </a:fontRef>
+        </p:style>
+        <p:txBody>
+          <a:bodyPr rtlCol="0" anchor="ctr"/>
+          <a:lstStyle/>
+          <a:p>
+            <a:pPr algn="ctr"/>
+            <a:endParaRPr lang="ko-KR" altLang="en-US"/>
+          </a:p>
+        </p:txBody>
+      </p:sp>
+      <p:sp>
+        <p:nvSpPr>
+          <p:cNvPr id="10" name="설명선 1 9"/>
+          <p:cNvSpPr/>
+          <p:nvPr/>
+        </p:nvSpPr>
+        <p:spPr>
+          <a:xfrm>
+            <a:off x="8597248" y="5458118"/>
+            <a:ext cx="1781666" cy="414780"/>
+          </a:xfrm>
+          <a:prstGeom prst="borderCallout1">
+            <a:avLst>
+              <a:gd name="adj1" fmla="val 64205"/>
+              <a:gd name="adj2" fmla="val 2517"/>
+              <a:gd name="adj3" fmla="val 57955"/>
+              <a:gd name="adj4" fmla="val -28812"/>
+            </a:avLst>
+          </a:prstGeom>
+        </p:spPr>
+        <p:style>
+          <a:lnRef idx="2">
+            <a:schemeClr val="accent1">
+              <a:shade val="50000"/>
+            </a:schemeClr>
+          </a:lnRef>
+          <a:fillRef idx="1">
+            <a:schemeClr val="accent1"/>
+          </a:fillRef>
+          <a:effectRef idx="0">
+            <a:schemeClr val="accent1"/>
+          </a:effectRef>
+          <a:fontRef idx="minor">
+            <a:schemeClr val="lt1"/>
+          </a:fontRef>
+        </p:style>
+        <p:txBody>
+          <a:bodyPr rtlCol="0" anchor="ctr"/>
+          <a:lstStyle/>
+          <a:p>
+            <a:pPr algn="ctr"/>
+            <a:r>
+              <a:rPr lang="en-US" altLang="ko-KR" dirty="0" err="1" smtClean="0"/>
+              <a:t>key_div</a:t>
+            </a:r>
+            <a:endParaRPr lang="ko-KR" altLang="en-US" dirty="0"/>
+          </a:p>
+        </p:txBody>
+      </p:sp>
+      <p:sp>
+        <p:nvSpPr>
+          <p:cNvPr id="11" name="직사각형 10"/>
+          <p:cNvSpPr/>
+          <p:nvPr/>
+        </p:nvSpPr>
+        <p:spPr>
+          <a:xfrm>
+            <a:off x="160256" y="150829"/>
+            <a:ext cx="3954547" cy="499620"/>
+          </a:xfrm>
+          <a:prstGeom prst="rect">
+            <a:avLst/>
+          </a:prstGeom>
+          <a:solidFill>
+            <a:srgbClr val="FFC000"/>
+          </a:solidFill>
+        </p:spPr>
+        <p:style>
+          <a:lnRef idx="2">
+            <a:schemeClr val="accent1">
+              <a:shade val="50000"/>
+            </a:schemeClr>
+          </a:lnRef>
+          <a:fillRef idx="1">
+            <a:schemeClr val="accent1"/>
+          </a:fillRef>
+          <a:effectRef idx="0">
+            <a:schemeClr val="accent1"/>
+          </a:effectRef>
+          <a:fontRef idx="minor">
+            <a:schemeClr val="lt1"/>
+          </a:fontRef>
+        </p:style>
+        <p:txBody>
+          <a:bodyPr rtlCol="0" anchor="ctr"/>
+          <a:lstStyle/>
+          <a:p>
+            <a:pPr algn="ctr"/>
+            <a:r>
+              <a:rPr lang="en-US" altLang="ko-KR" dirty="0" smtClean="0">
+                <a:solidFill>
+                  <a:schemeClr val="tx1"/>
+                </a:solidFill>
+              </a:rPr>
+              <a:t>Layout Example</a:t>
+            </a:r>
+            <a:endParaRPr lang="ko-KR" altLang="en-US" dirty="0">
+              <a:solidFill>
+                <a:schemeClr val="tx1"/>
+              </a:solidFill>
+            </a:endParaRPr>
+          </a:p>
+        </p:txBody>
+      </p:sp>
+    </p:spTree>
+    <p:extLst>
+      <p:ext uri="{BB962C8B-B14F-4D97-AF65-F5344CB8AC3E}">
+        <p14:creationId xmlns:p14="http://schemas.microsoft.com/office/powerpoint/2010/main" val="3418503151"/>
+      </p:ext>
+    </p:extLst>
+  </p:cSld>
+  <p:clrMapOvr>
+    <a:masterClrMapping/>
+  </p:clrMapOvr>
+</p:sld>
+</file>
+
+<file path=ppt/slides/slide9.xml><?xml version="1.0" encoding="utf-8"?>
+<p:sld xmlns:a="http://schemas.openxmlformats.org/drawingml/2006/main" xmlns:r="http://schemas.openxmlformats.org/officeDocument/2006/relationships" xmlns:p="http://schemas.openxmlformats.org/presentationml/2006/main">
+  <p:cSld>
+    <p:spTree>
+      <p:nvGrpSpPr>
+        <p:cNvPr id="1" name=""/>
+        <p:cNvGrpSpPr/>
+        <p:nvPr/>
+      </p:nvGrpSpPr>
+      <p:grpSpPr>
+        <a:xfrm>
+          <a:off x="0" y="0"/>
+          <a:ext cx="0" cy="0"/>
+          <a:chOff x="0" y="0"/>
+          <a:chExt cx="0" cy="0"/>
+        </a:xfrm>
+      </p:grpSpPr>
+      <p:sp>
+        <p:nvSpPr>
+          <p:cNvPr id="2" name="직사각형 1"/>
+          <p:cNvSpPr/>
+          <p:nvPr/>
+        </p:nvSpPr>
+        <p:spPr>
+          <a:xfrm>
+            <a:off x="1121792" y="2356700"/>
+            <a:ext cx="3959257" cy="3930978"/>
+          </a:xfrm>
+          <a:prstGeom prst="rect">
+            <a:avLst/>
+          </a:prstGeom>
+          <a:noFill/>
+          <a:ln>
+            <a:solidFill>
+              <a:schemeClr val="tx1"/>
+            </a:solidFill>
+          </a:ln>
+        </p:spPr>
+        <p:style>
+          <a:lnRef idx="2">
+            <a:schemeClr val="accent1">
+              <a:shade val="50000"/>
+            </a:schemeClr>
+          </a:lnRef>
+          <a:fillRef idx="1">
+            <a:schemeClr val="accent1"/>
+          </a:fillRef>
+          <a:effectRef idx="0">
+            <a:schemeClr val="accent1"/>
+          </a:effectRef>
+          <a:fontRef idx="minor">
+            <a:schemeClr val="lt1"/>
+          </a:fontRef>
+        </p:style>
+        <p:txBody>
+          <a:bodyPr rtlCol="0" anchor="ctr"/>
+          <a:lstStyle/>
+          <a:p>
+            <a:pPr algn="ctr"/>
+            <a:r>
+              <a:rPr lang="en-US" altLang="ko-KR" sz="6000" dirty="0" smtClean="0">
+                <a:solidFill>
+                  <a:schemeClr val="tx1"/>
+                </a:solidFill>
+              </a:rPr>
+              <a:t>[</a:t>
+            </a:r>
+            <a:r>
+              <a:rPr lang="en-US" altLang="ko-KR" sz="3600" dirty="0" smtClean="0">
+                <a:solidFill>
+                  <a:schemeClr val="tx1"/>
+                </a:solidFill>
+              </a:rPr>
+              <a:t>[ 1, 0, 1, 1, 0],</a:t>
+            </a:r>
+          </a:p>
+          <a:p>
+            <a:pPr algn="ctr"/>
+            <a:r>
+              <a:rPr lang="en-US" altLang="ko-KR" sz="3600" dirty="0" smtClean="0">
+                <a:solidFill>
+                  <a:schemeClr val="tx1"/>
+                </a:solidFill>
+              </a:rPr>
+              <a:t> [ 3, 0, 1, 1, 0],</a:t>
+            </a:r>
+          </a:p>
+          <a:p>
+            <a:pPr algn="ctr"/>
+            <a:r>
+              <a:rPr lang="en-US" altLang="ko-KR" sz="3600" dirty="0">
+                <a:solidFill>
+                  <a:schemeClr val="tx1"/>
+                </a:solidFill>
+              </a:rPr>
+              <a:t> </a:t>
+            </a:r>
+            <a:r>
+              <a:rPr lang="en-US" altLang="ko-KR" sz="3600" dirty="0" smtClean="0">
+                <a:solidFill>
+                  <a:schemeClr val="tx1"/>
+                </a:solidFill>
+              </a:rPr>
+              <a:t>[ 4, </a:t>
+            </a:r>
+            <a:r>
+              <a:rPr lang="en-US" altLang="ko-KR" sz="3600" dirty="0">
+                <a:solidFill>
+                  <a:schemeClr val="tx1"/>
+                </a:solidFill>
+              </a:rPr>
+              <a:t>0, 1, 1, 0</a:t>
+            </a:r>
+            <a:r>
+              <a:rPr lang="en-US" altLang="ko-KR" sz="3600" dirty="0" smtClean="0">
+                <a:solidFill>
+                  <a:schemeClr val="tx1"/>
+                </a:solidFill>
+              </a:rPr>
+              <a:t>],</a:t>
+            </a:r>
+          </a:p>
+          <a:p>
+            <a:pPr algn="ctr"/>
+            <a:r>
+              <a:rPr lang="en-US" altLang="ko-KR" sz="3600" dirty="0">
+                <a:solidFill>
+                  <a:schemeClr val="tx1"/>
+                </a:solidFill>
+              </a:rPr>
+              <a:t> </a:t>
+            </a:r>
+            <a:r>
+              <a:rPr lang="en-US" altLang="ko-KR" sz="3600" dirty="0" smtClean="0">
+                <a:solidFill>
+                  <a:schemeClr val="tx1"/>
+                </a:solidFill>
+              </a:rPr>
+              <a:t>[ 5, 1, </a:t>
+            </a:r>
+            <a:r>
+              <a:rPr lang="en-US" altLang="ko-KR" sz="3600" dirty="0">
+                <a:solidFill>
+                  <a:schemeClr val="tx1"/>
+                </a:solidFill>
+              </a:rPr>
+              <a:t>1, 1, </a:t>
+            </a:r>
+            <a:r>
+              <a:rPr lang="en-US" altLang="ko-KR" sz="3600" dirty="0" smtClean="0">
+                <a:solidFill>
+                  <a:schemeClr val="tx1"/>
+                </a:solidFill>
+              </a:rPr>
+              <a:t>1],</a:t>
+            </a:r>
+          </a:p>
+          <a:p>
+            <a:pPr algn="ctr"/>
+            <a:r>
+              <a:rPr lang="en-US" altLang="ko-KR" sz="3600" dirty="0">
+                <a:solidFill>
+                  <a:schemeClr val="tx1"/>
+                </a:solidFill>
+              </a:rPr>
+              <a:t> </a:t>
+            </a:r>
+            <a:r>
+              <a:rPr lang="en-US" altLang="ko-KR" sz="3600" dirty="0" smtClean="0">
+                <a:solidFill>
+                  <a:schemeClr val="tx1"/>
+                </a:solidFill>
+              </a:rPr>
+              <a:t>[ 8, </a:t>
+            </a:r>
+            <a:r>
+              <a:rPr lang="en-US" altLang="ko-KR" sz="3600" dirty="0">
+                <a:solidFill>
+                  <a:schemeClr val="tx1"/>
+                </a:solidFill>
+              </a:rPr>
+              <a:t>0, 1, 1, 0</a:t>
+            </a:r>
+            <a:r>
+              <a:rPr lang="en-US" altLang="ko-KR" sz="3600" dirty="0" smtClean="0">
+                <a:solidFill>
+                  <a:schemeClr val="tx1"/>
+                </a:solidFill>
+              </a:rPr>
+              <a:t>]</a:t>
+            </a:r>
+            <a:r>
+              <a:rPr lang="en-US" altLang="ko-KR" sz="6600" dirty="0" smtClean="0">
+                <a:solidFill>
+                  <a:schemeClr val="tx1"/>
+                </a:solidFill>
+              </a:rPr>
+              <a:t>]</a:t>
+            </a:r>
+            <a:endParaRPr lang="ko-KR" altLang="en-US" sz="6600" dirty="0">
+              <a:solidFill>
+                <a:schemeClr val="tx1"/>
+              </a:solidFill>
+            </a:endParaRPr>
+          </a:p>
+        </p:txBody>
+      </p:sp>
+      <p:sp>
+        <p:nvSpPr>
+          <p:cNvPr id="3" name="직사각형 2"/>
+          <p:cNvSpPr/>
+          <p:nvPr/>
+        </p:nvSpPr>
+        <p:spPr>
+          <a:xfrm>
+            <a:off x="1781666" y="2799762"/>
+            <a:ext cx="735291" cy="3271100"/>
+          </a:xfrm>
+          <a:prstGeom prst="rect">
+            <a:avLst/>
+          </a:prstGeom>
+          <a:noFill/>
+          <a:ln w="28575">
+            <a:solidFill>
+              <a:srgbClr val="FF0000"/>
+            </a:solidFill>
+          </a:ln>
+        </p:spPr>
+        <p:style>
+          <a:lnRef idx="2">
+            <a:schemeClr val="accent1">
+              <a:shade val="50000"/>
+            </a:schemeClr>
+          </a:lnRef>
+          <a:fillRef idx="1">
+            <a:schemeClr val="accent1"/>
+          </a:fillRef>
+          <a:effectRef idx="0">
+            <a:schemeClr val="accent1"/>
+          </a:effectRef>
+          <a:fontRef idx="minor">
+            <a:schemeClr val="lt1"/>
+          </a:fontRef>
+        </p:style>
+        <p:txBody>
+          <a:bodyPr rtlCol="0" anchor="ctr"/>
+          <a:lstStyle/>
+          <a:p>
+            <a:pPr algn="ctr"/>
+            <a:endParaRPr lang="ko-KR" altLang="en-US"/>
+          </a:p>
+        </p:txBody>
+      </p:sp>
+      <p:sp>
+        <p:nvSpPr>
+          <p:cNvPr id="4" name="직사각형 3"/>
+          <p:cNvSpPr/>
+          <p:nvPr/>
+        </p:nvSpPr>
+        <p:spPr>
+          <a:xfrm>
+            <a:off x="2601798" y="2799762"/>
+            <a:ext cx="1857080" cy="650448"/>
+          </a:xfrm>
+          <a:prstGeom prst="rect">
+            <a:avLst/>
+          </a:prstGeom>
+          <a:noFill/>
+          <a:ln w="28575">
+            <a:solidFill>
+              <a:srgbClr val="00B0F0"/>
+            </a:solidFill>
+          </a:ln>
+        </p:spPr>
+        <p:style>
+          <a:lnRef idx="2">
+            <a:schemeClr val="accent1">
+              <a:shade val="50000"/>
+            </a:schemeClr>
+          </a:lnRef>
+          <a:fillRef idx="1">
+            <a:schemeClr val="accent1"/>
+          </a:fillRef>
+          <a:effectRef idx="0">
+            <a:schemeClr val="accent1"/>
+          </a:effectRef>
+          <a:fontRef idx="minor">
+            <a:schemeClr val="lt1"/>
+          </a:fontRef>
+        </p:style>
+        <p:txBody>
+          <a:bodyPr rtlCol="0" anchor="ctr"/>
+          <a:lstStyle/>
+          <a:p>
+            <a:pPr algn="ctr"/>
+            <a:endParaRPr lang="ko-KR" altLang="en-US"/>
+          </a:p>
+        </p:txBody>
+      </p:sp>
+      <p:sp>
+        <p:nvSpPr>
+          <p:cNvPr id="5" name="설명선 1 4"/>
+          <p:cNvSpPr/>
+          <p:nvPr/>
+        </p:nvSpPr>
+        <p:spPr>
+          <a:xfrm>
+            <a:off x="4736969" y="1809945"/>
+            <a:ext cx="1776952" cy="848413"/>
+          </a:xfrm>
+          <a:prstGeom prst="borderCallout1">
+            <a:avLst>
+              <a:gd name="adj1" fmla="val 54287"/>
+              <a:gd name="adj2" fmla="val 10470"/>
+              <a:gd name="adj3" fmla="val 112500"/>
+              <a:gd name="adj4" fmla="val -38333"/>
+            </a:avLst>
+          </a:prstGeom>
+        </p:spPr>
+        <p:style>
+          <a:lnRef idx="2">
+            <a:schemeClr val="accent1">
+              <a:shade val="50000"/>
+            </a:schemeClr>
+          </a:lnRef>
+          <a:fillRef idx="1">
+            <a:schemeClr val="accent1"/>
+          </a:fillRef>
+          <a:effectRef idx="0">
+            <a:schemeClr val="accent1"/>
+          </a:effectRef>
+          <a:fontRef idx="minor">
+            <a:schemeClr val="lt1"/>
+          </a:fontRef>
+        </p:style>
+        <p:txBody>
+          <a:bodyPr rtlCol="0" anchor="ctr"/>
+          <a:lstStyle/>
+          <a:p>
+            <a:pPr algn="ctr"/>
+            <a:r>
+              <a:rPr lang="ko-KR" altLang="en-US" dirty="0" smtClean="0"/>
+              <a:t>손가락 위치</a:t>
+            </a:r>
+            <a:endParaRPr lang="ko-KR" altLang="en-US" dirty="0"/>
+          </a:p>
+        </p:txBody>
+      </p:sp>
+      <p:sp>
+        <p:nvSpPr>
+          <p:cNvPr id="6" name="설명선 1 5"/>
+          <p:cNvSpPr/>
+          <p:nvPr/>
+        </p:nvSpPr>
+        <p:spPr>
+          <a:xfrm>
+            <a:off x="1065231" y="1508287"/>
+            <a:ext cx="2582942" cy="848413"/>
+          </a:xfrm>
+          <a:prstGeom prst="borderCallout1">
+            <a:avLst>
+              <a:gd name="adj1" fmla="val 106509"/>
+              <a:gd name="adj2" fmla="val 50258"/>
+              <a:gd name="adj3" fmla="val 161389"/>
+              <a:gd name="adj4" fmla="val 57157"/>
+            </a:avLst>
+          </a:prstGeom>
+        </p:spPr>
+        <p:style>
+          <a:lnRef idx="2">
+            <a:schemeClr val="accent1">
+              <a:shade val="50000"/>
+            </a:schemeClr>
+          </a:lnRef>
+          <a:fillRef idx="1">
+            <a:schemeClr val="accent1"/>
+          </a:fillRef>
+          <a:effectRef idx="0">
+            <a:schemeClr val="accent1"/>
+          </a:effectRef>
+          <a:fontRef idx="minor">
+            <a:schemeClr val="lt1"/>
+          </a:fontRef>
+        </p:style>
+        <p:txBody>
+          <a:bodyPr rtlCol="0" anchor="ctr"/>
+          <a:lstStyle/>
+          <a:p>
+            <a:pPr algn="ctr"/>
+            <a:r>
+              <a:rPr lang="en-US" altLang="ko-KR" dirty="0" smtClean="0"/>
+              <a:t>Note </a:t>
+            </a:r>
+            <a:r>
+              <a:rPr lang="ko-KR" altLang="en-US" dirty="0" smtClean="0"/>
+              <a:t>떨어지는 시간</a:t>
+            </a:r>
+            <a:r>
+              <a:rPr lang="en-US" altLang="ko-KR" dirty="0" smtClean="0"/>
+              <a:t>(</a:t>
+            </a:r>
+            <a:r>
+              <a:rPr lang="ko-KR" altLang="en-US" dirty="0" smtClean="0"/>
+              <a:t>초</a:t>
+            </a:r>
+            <a:r>
+              <a:rPr lang="en-US" altLang="ko-KR" dirty="0" smtClean="0"/>
+              <a:t>)</a:t>
+            </a:r>
+            <a:endParaRPr lang="ko-KR" altLang="en-US" dirty="0"/>
+          </a:p>
+        </p:txBody>
+      </p:sp>
+      <p:sp>
+        <p:nvSpPr>
+          <p:cNvPr id="7" name="직사각형 6"/>
+          <p:cNvSpPr/>
+          <p:nvPr/>
+        </p:nvSpPr>
+        <p:spPr>
+          <a:xfrm>
+            <a:off x="292232" y="424202"/>
+            <a:ext cx="5618376" cy="678730"/>
+          </a:xfrm>
+          <a:prstGeom prst="rect">
+            <a:avLst/>
+          </a:prstGeom>
+        </p:spPr>
+        <p:style>
+          <a:lnRef idx="2">
+            <a:schemeClr val="dk1">
+              <a:shade val="50000"/>
+            </a:schemeClr>
+          </a:lnRef>
+          <a:fillRef idx="1">
+            <a:schemeClr val="dk1"/>
+          </a:fillRef>
+          <a:effectRef idx="0">
+            <a:schemeClr val="dk1"/>
+          </a:effectRef>
+          <a:fontRef idx="minor">
+            <a:schemeClr val="lt1"/>
+          </a:fontRef>
+        </p:style>
+        <p:txBody>
+          <a:bodyPr rtlCol="0" anchor="ctr"/>
+          <a:lstStyle/>
+          <a:p>
+            <a:pPr algn="ctr"/>
+            <a:r>
+              <a:rPr lang="ko-KR" altLang="en-US" dirty="0" smtClean="0"/>
+              <a:t>결과물</a:t>
+            </a:r>
+            <a:r>
+              <a:rPr lang="en-US" altLang="ko-KR" dirty="0" smtClean="0"/>
+              <a:t>1 – </a:t>
+            </a:r>
+            <a:r>
+              <a:rPr lang="ko-KR" altLang="en-US" dirty="0" err="1" smtClean="0"/>
+              <a:t>강남스타일</a:t>
+            </a:r>
+            <a:r>
+              <a:rPr lang="en-US" altLang="ko-KR" dirty="0" smtClean="0"/>
+              <a:t>/30</a:t>
+            </a:r>
+            <a:r>
+              <a:rPr lang="ko-KR" altLang="en-US" dirty="0" smtClean="0"/>
+              <a:t>초</a:t>
+            </a:r>
+            <a:r>
+              <a:rPr lang="en-US" altLang="ko-KR" dirty="0" smtClean="0"/>
+              <a:t>/</a:t>
+            </a:r>
+            <a:r>
+              <a:rPr lang="ko-KR" altLang="en-US" dirty="0" smtClean="0"/>
+              <a:t>난이도 하</a:t>
+            </a:r>
+            <a:r>
+              <a:rPr lang="en-US" altLang="ko-KR" dirty="0" smtClean="0"/>
+              <a:t>(key 4)</a:t>
+            </a:r>
+            <a:endParaRPr lang="ko-KR" altLang="en-US" dirty="0"/>
+          </a:p>
+        </p:txBody>
+      </p:sp>
+    </p:spTree>
+    <p:extLst>
+      <p:ext uri="{BB962C8B-B14F-4D97-AF65-F5344CB8AC3E}">
+        <p14:creationId xmlns:p14="http://schemas.microsoft.com/office/powerpoint/2010/main" val="1158532923"/>
+      </p:ext>
+    </p:extLst>
+  </p:cSld>
+  <p:clrMapOvr>
+    <a:masterClrMapping/>
+  </p:clrMapOvr>
+</p:sld>
+</file>
+
 <file path=ppt/theme/theme1.xml><?xml version="1.0" encoding="utf-8"?>
 <a:theme xmlns:a="http://schemas.openxmlformats.org/drawingml/2006/main" name="Office 테마">
   <a:themeElements>

</xml_diff>

<commit_message>
Add note width img for wiki By Jisoo
</commit_message>
<xml_diff>
--- a/project guide/project_guide_extra.pptx
+++ b/project guide/project_guide_extra.pptx
@@ -15,6 +15,7 @@
     <p:sldId id="263" r:id="rId9"/>
     <p:sldId id="264" r:id="rId10"/>
     <p:sldId id="265" r:id="rId11"/>
+    <p:sldId id="266" r:id="rId12"/>
   </p:sldIdLst>
   <p:sldSz cx="12192000" cy="6858000"/>
   <p:notesSz cx="6858000" cy="9144000"/>
@@ -3518,6 +3519,1032 @@
     <p:extLst>
       <p:ext uri="{BB962C8B-B14F-4D97-AF65-F5344CB8AC3E}">
         <p14:creationId xmlns:p14="http://schemas.microsoft.com/office/powerpoint/2010/main" val="975857500"/>
+      </p:ext>
+    </p:extLst>
+  </p:cSld>
+  <p:clrMapOvr>
+    <a:masterClrMapping/>
+  </p:clrMapOvr>
+</p:sld>
+</file>
+
+<file path=ppt/slides/slide11.xml><?xml version="1.0" encoding="utf-8"?>
+<p:sld xmlns:a="http://schemas.openxmlformats.org/drawingml/2006/main" xmlns:r="http://schemas.openxmlformats.org/officeDocument/2006/relationships" xmlns:p="http://schemas.openxmlformats.org/presentationml/2006/main">
+  <p:cSld>
+    <p:spTree>
+      <p:nvGrpSpPr>
+        <p:cNvPr id="1" name=""/>
+        <p:cNvGrpSpPr/>
+        <p:nvPr/>
+      </p:nvGrpSpPr>
+      <p:grpSpPr>
+        <a:xfrm>
+          <a:off x="0" y="0"/>
+          <a:ext cx="0" cy="0"/>
+          <a:chOff x="0" y="0"/>
+          <a:chExt cx="0" cy="0"/>
+        </a:xfrm>
+      </p:grpSpPr>
+      <p:sp>
+        <p:nvSpPr>
+          <p:cNvPr id="2" name="직사각형 1"/>
+          <p:cNvSpPr/>
+          <p:nvPr/>
+        </p:nvSpPr>
+        <p:spPr>
+          <a:xfrm>
+            <a:off x="1140643" y="857839"/>
+            <a:ext cx="9747315" cy="2837468"/>
+          </a:xfrm>
+          <a:prstGeom prst="rect">
+            <a:avLst/>
+          </a:prstGeom>
+        </p:spPr>
+        <p:style>
+          <a:lnRef idx="2">
+            <a:schemeClr val="accent1">
+              <a:shade val="50000"/>
+            </a:schemeClr>
+          </a:lnRef>
+          <a:fillRef idx="1">
+            <a:schemeClr val="accent1"/>
+          </a:fillRef>
+          <a:effectRef idx="0">
+            <a:schemeClr val="accent1"/>
+          </a:effectRef>
+          <a:fontRef idx="minor">
+            <a:schemeClr val="lt1"/>
+          </a:fontRef>
+        </p:style>
+        <p:txBody>
+          <a:bodyPr rtlCol="0" anchor="ctr"/>
+          <a:lstStyle/>
+          <a:p>
+            <a:pPr algn="ctr"/>
+            <a:endParaRPr lang="ko-KR" altLang="en-US"/>
+          </a:p>
+        </p:txBody>
+      </p:sp>
+      <p:sp>
+        <p:nvSpPr>
+          <p:cNvPr id="3" name="직사각형 2"/>
+          <p:cNvSpPr/>
+          <p:nvPr/>
+        </p:nvSpPr>
+        <p:spPr>
+          <a:xfrm>
+            <a:off x="1611984" y="1038519"/>
+            <a:ext cx="8719793" cy="2487106"/>
+          </a:xfrm>
+          <a:prstGeom prst="rect">
+            <a:avLst/>
+          </a:prstGeom>
+          <a:solidFill>
+            <a:schemeClr val="tx2">
+              <a:lumMod val="20000"/>
+              <a:lumOff val="80000"/>
+            </a:schemeClr>
+          </a:solidFill>
+        </p:spPr>
+        <p:style>
+          <a:lnRef idx="2">
+            <a:schemeClr val="accent1">
+              <a:shade val="50000"/>
+            </a:schemeClr>
+          </a:lnRef>
+          <a:fillRef idx="1">
+            <a:schemeClr val="accent1"/>
+          </a:fillRef>
+          <a:effectRef idx="0">
+            <a:schemeClr val="accent1"/>
+          </a:effectRef>
+          <a:fontRef idx="minor">
+            <a:schemeClr val="lt1"/>
+          </a:fontRef>
+        </p:style>
+        <p:txBody>
+          <a:bodyPr rtlCol="0" anchor="ctr"/>
+          <a:lstStyle/>
+          <a:p>
+            <a:pPr algn="ctr"/>
+            <a:r>
+              <a:rPr lang="en-US" altLang="ko-KR" dirty="0" smtClean="0">
+                <a:solidFill>
+                  <a:schemeClr val="tx1"/>
+                </a:solidFill>
+              </a:rPr>
+              <a:t>                .   .   .   . </a:t>
+            </a:r>
+            <a:endParaRPr lang="ko-KR" altLang="en-US" dirty="0">
+              <a:solidFill>
+                <a:schemeClr val="tx1"/>
+              </a:solidFill>
+            </a:endParaRPr>
+          </a:p>
+        </p:txBody>
+      </p:sp>
+      <p:sp>
+        <p:nvSpPr>
+          <p:cNvPr id="4" name="직사각형 3"/>
+          <p:cNvSpPr/>
+          <p:nvPr/>
+        </p:nvSpPr>
+        <p:spPr>
+          <a:xfrm>
+            <a:off x="2003196" y="1791093"/>
+            <a:ext cx="1102936" cy="810705"/>
+          </a:xfrm>
+          <a:prstGeom prst="rect">
+            <a:avLst/>
+          </a:prstGeom>
+        </p:spPr>
+        <p:style>
+          <a:lnRef idx="2">
+            <a:schemeClr val="accent1">
+              <a:shade val="50000"/>
+            </a:schemeClr>
+          </a:lnRef>
+          <a:fillRef idx="1">
+            <a:schemeClr val="accent1"/>
+          </a:fillRef>
+          <a:effectRef idx="0">
+            <a:schemeClr val="accent1"/>
+          </a:effectRef>
+          <a:fontRef idx="minor">
+            <a:schemeClr val="lt1"/>
+          </a:fontRef>
+        </p:style>
+        <p:txBody>
+          <a:bodyPr rtlCol="0" anchor="ctr"/>
+          <a:lstStyle/>
+          <a:p>
+            <a:pPr algn="ctr"/>
+            <a:r>
+              <a:rPr lang="en-US" altLang="ko-KR" dirty="0"/>
+              <a:t>1</a:t>
+            </a:r>
+            <a:endParaRPr lang="ko-KR" altLang="en-US" dirty="0"/>
+          </a:p>
+        </p:txBody>
+      </p:sp>
+      <p:sp>
+        <p:nvSpPr>
+          <p:cNvPr id="5" name="직사각형 4"/>
+          <p:cNvSpPr/>
+          <p:nvPr/>
+        </p:nvSpPr>
+        <p:spPr>
+          <a:xfrm>
+            <a:off x="3304095" y="1791093"/>
+            <a:ext cx="1102936" cy="810705"/>
+          </a:xfrm>
+          <a:prstGeom prst="rect">
+            <a:avLst/>
+          </a:prstGeom>
+        </p:spPr>
+        <p:style>
+          <a:lnRef idx="2">
+            <a:schemeClr val="accent1">
+              <a:shade val="50000"/>
+            </a:schemeClr>
+          </a:lnRef>
+          <a:fillRef idx="1">
+            <a:schemeClr val="accent1"/>
+          </a:fillRef>
+          <a:effectRef idx="0">
+            <a:schemeClr val="accent1"/>
+          </a:effectRef>
+          <a:fontRef idx="minor">
+            <a:schemeClr val="lt1"/>
+          </a:fontRef>
+        </p:style>
+        <p:txBody>
+          <a:bodyPr rtlCol="0" anchor="ctr"/>
+          <a:lstStyle/>
+          <a:p>
+            <a:pPr algn="ctr"/>
+            <a:r>
+              <a:rPr lang="en-US" altLang="ko-KR" dirty="0" smtClean="0"/>
+              <a:t>2</a:t>
+            </a:r>
+            <a:endParaRPr lang="ko-KR" altLang="en-US" dirty="0"/>
+          </a:p>
+        </p:txBody>
+      </p:sp>
+      <p:sp>
+        <p:nvSpPr>
+          <p:cNvPr id="6" name="직사각형 5"/>
+          <p:cNvSpPr/>
+          <p:nvPr/>
+        </p:nvSpPr>
+        <p:spPr>
+          <a:xfrm>
+            <a:off x="4887798" y="1791093"/>
+            <a:ext cx="1102936" cy="810705"/>
+          </a:xfrm>
+          <a:prstGeom prst="rect">
+            <a:avLst/>
+          </a:prstGeom>
+        </p:spPr>
+        <p:style>
+          <a:lnRef idx="2">
+            <a:schemeClr val="accent1">
+              <a:shade val="50000"/>
+            </a:schemeClr>
+          </a:lnRef>
+          <a:fillRef idx="1">
+            <a:schemeClr val="accent1"/>
+          </a:fillRef>
+          <a:effectRef idx="0">
+            <a:schemeClr val="accent1"/>
+          </a:effectRef>
+          <a:fontRef idx="minor">
+            <a:schemeClr val="lt1"/>
+          </a:fontRef>
+        </p:style>
+        <p:txBody>
+          <a:bodyPr rtlCol="0" anchor="ctr"/>
+          <a:lstStyle/>
+          <a:p>
+            <a:pPr algn="ctr"/>
+            <a:r>
+              <a:rPr lang="en-US" altLang="ko-KR" dirty="0" smtClean="0"/>
+              <a:t>3</a:t>
+            </a:r>
+            <a:endParaRPr lang="ko-KR" altLang="en-US" dirty="0"/>
+          </a:p>
+        </p:txBody>
+      </p:sp>
+      <p:sp>
+        <p:nvSpPr>
+          <p:cNvPr id="7" name="직사각형 6"/>
+          <p:cNvSpPr/>
+          <p:nvPr/>
+        </p:nvSpPr>
+        <p:spPr>
+          <a:xfrm>
+            <a:off x="7088956" y="1797443"/>
+            <a:ext cx="1102936" cy="810705"/>
+          </a:xfrm>
+          <a:prstGeom prst="rect">
+            <a:avLst/>
+          </a:prstGeom>
+        </p:spPr>
+        <p:style>
+          <a:lnRef idx="2">
+            <a:schemeClr val="accent1">
+              <a:shade val="50000"/>
+            </a:schemeClr>
+          </a:lnRef>
+          <a:fillRef idx="1">
+            <a:schemeClr val="accent1"/>
+          </a:fillRef>
+          <a:effectRef idx="0">
+            <a:schemeClr val="accent1"/>
+          </a:effectRef>
+          <a:fontRef idx="minor">
+            <a:schemeClr val="lt1"/>
+          </a:fontRef>
+        </p:style>
+        <p:txBody>
+          <a:bodyPr rtlCol="0" anchor="ctr"/>
+          <a:lstStyle/>
+          <a:p>
+            <a:pPr algn="ctr"/>
+            <a:r>
+              <a:rPr lang="en-US" altLang="ko-KR" dirty="0" smtClean="0"/>
+              <a:t>N-1</a:t>
+            </a:r>
+            <a:endParaRPr lang="ko-KR" altLang="en-US" dirty="0"/>
+          </a:p>
+        </p:txBody>
+      </p:sp>
+      <p:sp>
+        <p:nvSpPr>
+          <p:cNvPr id="8" name="직사각형 7"/>
+          <p:cNvSpPr/>
+          <p:nvPr/>
+        </p:nvSpPr>
+        <p:spPr>
+          <a:xfrm>
+            <a:off x="8418136" y="1808375"/>
+            <a:ext cx="1102936" cy="810705"/>
+          </a:xfrm>
+          <a:prstGeom prst="rect">
+            <a:avLst/>
+          </a:prstGeom>
+        </p:spPr>
+        <p:style>
+          <a:lnRef idx="2">
+            <a:schemeClr val="accent1">
+              <a:shade val="50000"/>
+            </a:schemeClr>
+          </a:lnRef>
+          <a:fillRef idx="1">
+            <a:schemeClr val="accent1"/>
+          </a:fillRef>
+          <a:effectRef idx="0">
+            <a:schemeClr val="accent1"/>
+          </a:effectRef>
+          <a:fontRef idx="minor">
+            <a:schemeClr val="lt1"/>
+          </a:fontRef>
+        </p:style>
+        <p:txBody>
+          <a:bodyPr rtlCol="0" anchor="ctr"/>
+          <a:lstStyle/>
+          <a:p>
+            <a:pPr algn="ctr"/>
+            <a:r>
+              <a:rPr lang="en-US" altLang="ko-KR" dirty="0" smtClean="0"/>
+              <a:t>N</a:t>
+            </a:r>
+            <a:endParaRPr lang="ko-KR" altLang="en-US" dirty="0"/>
+          </a:p>
+        </p:txBody>
+      </p:sp>
+      <p:cxnSp>
+        <p:nvCxnSpPr>
+          <p:cNvPr id="10" name="꺾인 연결선 9"/>
+          <p:cNvCxnSpPr>
+            <a:stCxn id="4" idx="2"/>
+            <a:endCxn id="8" idx="2"/>
+          </p:cNvCxnSpPr>
+          <p:nvPr/>
+        </p:nvCxnSpPr>
+        <p:spPr>
+          <a:xfrm rot="16200000" flipH="1">
+            <a:off x="5753493" y="-597031"/>
+            <a:ext cx="17282" cy="6414940"/>
+          </a:xfrm>
+          <a:prstGeom prst="bentConnector3">
+            <a:avLst>
+              <a:gd name="adj1" fmla="val 1422764"/>
+            </a:avLst>
+          </a:prstGeom>
+        </p:spPr>
+        <p:style>
+          <a:lnRef idx="1">
+            <a:schemeClr val="accent1"/>
+          </a:lnRef>
+          <a:fillRef idx="0">
+            <a:schemeClr val="accent1"/>
+          </a:fillRef>
+          <a:effectRef idx="0">
+            <a:schemeClr val="accent1"/>
+          </a:effectRef>
+          <a:fontRef idx="minor">
+            <a:schemeClr val="tx1"/>
+          </a:fontRef>
+        </p:style>
+      </p:cxnSp>
+      <p:cxnSp>
+        <p:nvCxnSpPr>
+          <p:cNvPr id="13" name="직선 화살표 연결선 12"/>
+          <p:cNvCxnSpPr/>
+          <p:nvPr/>
+        </p:nvCxnSpPr>
+        <p:spPr>
+          <a:xfrm>
+            <a:off x="1140643" y="4887797"/>
+            <a:ext cx="471341" cy="0"/>
+          </a:xfrm>
+          <a:prstGeom prst="straightConnector1">
+            <a:avLst/>
+          </a:prstGeom>
+          <a:ln w="12700">
+            <a:solidFill>
+              <a:schemeClr val="tx1"/>
+            </a:solidFill>
+            <a:headEnd type="triangle"/>
+            <a:tailEnd type="triangle"/>
+          </a:ln>
+        </p:spPr>
+        <p:style>
+          <a:lnRef idx="1">
+            <a:schemeClr val="accent1"/>
+          </a:lnRef>
+          <a:fillRef idx="0">
+            <a:schemeClr val="accent1"/>
+          </a:fillRef>
+          <a:effectRef idx="0">
+            <a:schemeClr val="accent1"/>
+          </a:effectRef>
+          <a:fontRef idx="minor">
+            <a:schemeClr val="tx1"/>
+          </a:fontRef>
+        </p:style>
+      </p:cxnSp>
+      <p:cxnSp>
+        <p:nvCxnSpPr>
+          <p:cNvPr id="16" name="직선 연결선 15"/>
+          <p:cNvCxnSpPr>
+            <a:stCxn id="2" idx="1"/>
+          </p:cNvCxnSpPr>
+          <p:nvPr/>
+        </p:nvCxnSpPr>
+        <p:spPr>
+          <a:xfrm>
+            <a:off x="1140643" y="2276573"/>
+            <a:ext cx="0" cy="2611224"/>
+          </a:xfrm>
+          <a:prstGeom prst="line">
+            <a:avLst/>
+          </a:prstGeom>
+          <a:ln w="19050">
+            <a:solidFill>
+              <a:srgbClr val="FF0000"/>
+            </a:solidFill>
+          </a:ln>
+        </p:spPr>
+        <p:style>
+          <a:lnRef idx="1">
+            <a:schemeClr val="accent1"/>
+          </a:lnRef>
+          <a:fillRef idx="0">
+            <a:schemeClr val="accent1"/>
+          </a:fillRef>
+          <a:effectRef idx="0">
+            <a:schemeClr val="accent1"/>
+          </a:effectRef>
+          <a:fontRef idx="minor">
+            <a:schemeClr val="tx1"/>
+          </a:fontRef>
+        </p:style>
+      </p:cxnSp>
+      <p:cxnSp>
+        <p:nvCxnSpPr>
+          <p:cNvPr id="18" name="직선 연결선 17"/>
+          <p:cNvCxnSpPr/>
+          <p:nvPr/>
+        </p:nvCxnSpPr>
+        <p:spPr>
+          <a:xfrm>
+            <a:off x="1611984" y="2276573"/>
+            <a:ext cx="0" cy="2611224"/>
+          </a:xfrm>
+          <a:prstGeom prst="line">
+            <a:avLst/>
+          </a:prstGeom>
+          <a:ln w="19050">
+            <a:solidFill>
+              <a:srgbClr val="FF0000"/>
+            </a:solidFill>
+          </a:ln>
+        </p:spPr>
+        <p:style>
+          <a:lnRef idx="1">
+            <a:schemeClr val="accent1"/>
+          </a:lnRef>
+          <a:fillRef idx="0">
+            <a:schemeClr val="accent1"/>
+          </a:fillRef>
+          <a:effectRef idx="0">
+            <a:schemeClr val="accent1"/>
+          </a:effectRef>
+          <a:fontRef idx="minor">
+            <a:schemeClr val="tx1"/>
+          </a:fontRef>
+        </p:style>
+      </p:cxnSp>
+      <p:cxnSp>
+        <p:nvCxnSpPr>
+          <p:cNvPr id="20" name="직선 연결선 19"/>
+          <p:cNvCxnSpPr/>
+          <p:nvPr/>
+        </p:nvCxnSpPr>
+        <p:spPr>
+          <a:xfrm>
+            <a:off x="9521072" y="2220013"/>
+            <a:ext cx="0" cy="2611224"/>
+          </a:xfrm>
+          <a:prstGeom prst="line">
+            <a:avLst/>
+          </a:prstGeom>
+          <a:ln w="19050">
+            <a:solidFill>
+              <a:schemeClr val="accent6">
+                <a:lumMod val="60000"/>
+                <a:lumOff val="40000"/>
+              </a:schemeClr>
+            </a:solidFill>
+          </a:ln>
+        </p:spPr>
+        <p:style>
+          <a:lnRef idx="1">
+            <a:schemeClr val="accent1"/>
+          </a:lnRef>
+          <a:fillRef idx="0">
+            <a:schemeClr val="accent1"/>
+          </a:fillRef>
+          <a:effectRef idx="0">
+            <a:schemeClr val="accent1"/>
+          </a:effectRef>
+          <a:fontRef idx="minor">
+            <a:schemeClr val="tx1"/>
+          </a:fontRef>
+        </p:style>
+      </p:cxnSp>
+      <p:cxnSp>
+        <p:nvCxnSpPr>
+          <p:cNvPr id="21" name="직선 연결선 20"/>
+          <p:cNvCxnSpPr/>
+          <p:nvPr/>
+        </p:nvCxnSpPr>
+        <p:spPr>
+          <a:xfrm>
+            <a:off x="10331777" y="2213727"/>
+            <a:ext cx="0" cy="2611224"/>
+          </a:xfrm>
+          <a:prstGeom prst="line">
+            <a:avLst/>
+          </a:prstGeom>
+          <a:ln w="19050">
+            <a:solidFill>
+              <a:schemeClr val="accent6">
+                <a:lumMod val="60000"/>
+                <a:lumOff val="40000"/>
+              </a:schemeClr>
+            </a:solidFill>
+          </a:ln>
+        </p:spPr>
+        <p:style>
+          <a:lnRef idx="1">
+            <a:schemeClr val="accent1"/>
+          </a:lnRef>
+          <a:fillRef idx="0">
+            <a:schemeClr val="accent1"/>
+          </a:fillRef>
+          <a:effectRef idx="0">
+            <a:schemeClr val="accent1"/>
+          </a:effectRef>
+          <a:fontRef idx="minor">
+            <a:schemeClr val="tx1"/>
+          </a:fontRef>
+        </p:style>
+      </p:cxnSp>
+      <p:cxnSp>
+        <p:nvCxnSpPr>
+          <p:cNvPr id="25" name="직선 화살표 연결선 24"/>
+          <p:cNvCxnSpPr/>
+          <p:nvPr/>
+        </p:nvCxnSpPr>
+        <p:spPr>
+          <a:xfrm>
+            <a:off x="9521072" y="4824951"/>
+            <a:ext cx="810705" cy="0"/>
+          </a:xfrm>
+          <a:prstGeom prst="straightConnector1">
+            <a:avLst/>
+          </a:prstGeom>
+          <a:ln w="12700">
+            <a:solidFill>
+              <a:schemeClr val="tx1"/>
+            </a:solidFill>
+            <a:headEnd type="triangle"/>
+            <a:tailEnd type="triangle"/>
+          </a:ln>
+        </p:spPr>
+        <p:style>
+          <a:lnRef idx="1">
+            <a:schemeClr val="accent1"/>
+          </a:lnRef>
+          <a:fillRef idx="0">
+            <a:schemeClr val="accent1"/>
+          </a:fillRef>
+          <a:effectRef idx="0">
+            <a:schemeClr val="accent1"/>
+          </a:effectRef>
+          <a:fontRef idx="minor">
+            <a:schemeClr val="tx1"/>
+          </a:fontRef>
+        </p:style>
+      </p:cxnSp>
+      <p:cxnSp>
+        <p:nvCxnSpPr>
+          <p:cNvPr id="27" name="직선 연결선 26"/>
+          <p:cNvCxnSpPr/>
+          <p:nvPr/>
+        </p:nvCxnSpPr>
+        <p:spPr>
+          <a:xfrm>
+            <a:off x="7079529" y="2282859"/>
+            <a:ext cx="0" cy="2611224"/>
+          </a:xfrm>
+          <a:prstGeom prst="line">
+            <a:avLst/>
+          </a:prstGeom>
+          <a:ln w="19050">
+            <a:solidFill>
+              <a:srgbClr val="FFFF00"/>
+            </a:solidFill>
+          </a:ln>
+        </p:spPr>
+        <p:style>
+          <a:lnRef idx="1">
+            <a:schemeClr val="accent1"/>
+          </a:lnRef>
+          <a:fillRef idx="0">
+            <a:schemeClr val="accent1"/>
+          </a:fillRef>
+          <a:effectRef idx="0">
+            <a:schemeClr val="accent1"/>
+          </a:effectRef>
+          <a:fontRef idx="minor">
+            <a:schemeClr val="tx1"/>
+          </a:fontRef>
+        </p:style>
+      </p:cxnSp>
+      <p:cxnSp>
+        <p:nvCxnSpPr>
+          <p:cNvPr id="28" name="직선 연결선 27"/>
+          <p:cNvCxnSpPr/>
+          <p:nvPr/>
+        </p:nvCxnSpPr>
+        <p:spPr>
+          <a:xfrm>
+            <a:off x="8191892" y="2276573"/>
+            <a:ext cx="0" cy="2611224"/>
+          </a:xfrm>
+          <a:prstGeom prst="line">
+            <a:avLst/>
+          </a:prstGeom>
+          <a:ln w="19050">
+            <a:solidFill>
+              <a:srgbClr val="FFFF00"/>
+            </a:solidFill>
+          </a:ln>
+        </p:spPr>
+        <p:style>
+          <a:lnRef idx="1">
+            <a:schemeClr val="accent1"/>
+          </a:lnRef>
+          <a:fillRef idx="0">
+            <a:schemeClr val="accent1"/>
+          </a:fillRef>
+          <a:effectRef idx="0">
+            <a:schemeClr val="accent1"/>
+          </a:effectRef>
+          <a:fontRef idx="minor">
+            <a:schemeClr val="tx1"/>
+          </a:fontRef>
+        </p:style>
+      </p:cxnSp>
+      <p:cxnSp>
+        <p:nvCxnSpPr>
+          <p:cNvPr id="29" name="직선 화살표 연결선 28"/>
+          <p:cNvCxnSpPr/>
+          <p:nvPr/>
+        </p:nvCxnSpPr>
+        <p:spPr>
+          <a:xfrm>
+            <a:off x="7079529" y="4887797"/>
+            <a:ext cx="1112363" cy="0"/>
+          </a:xfrm>
+          <a:prstGeom prst="straightConnector1">
+            <a:avLst/>
+          </a:prstGeom>
+          <a:ln w="12700">
+            <a:solidFill>
+              <a:schemeClr val="tx1"/>
+            </a:solidFill>
+            <a:headEnd type="triangle"/>
+            <a:tailEnd type="triangle"/>
+          </a:ln>
+        </p:spPr>
+        <p:style>
+          <a:lnRef idx="1">
+            <a:schemeClr val="accent1"/>
+          </a:lnRef>
+          <a:fillRef idx="0">
+            <a:schemeClr val="accent1"/>
+          </a:fillRef>
+          <a:effectRef idx="0">
+            <a:schemeClr val="accent1"/>
+          </a:effectRef>
+          <a:fontRef idx="minor">
+            <a:schemeClr val="tx1"/>
+          </a:fontRef>
+        </p:style>
+      </p:cxnSp>
+      <p:sp>
+        <p:nvSpPr>
+          <p:cNvPr id="31" name="TextBox 30"/>
+          <p:cNvSpPr txBox="1"/>
+          <p:nvPr/>
+        </p:nvSpPr>
+        <p:spPr>
+          <a:xfrm>
+            <a:off x="1215051" y="5013487"/>
+            <a:ext cx="322524" cy="369332"/>
+          </a:xfrm>
+          <a:prstGeom prst="rect">
+            <a:avLst/>
+          </a:prstGeom>
+          <a:noFill/>
+        </p:spPr>
+        <p:txBody>
+          <a:bodyPr wrap="none" rtlCol="0">
+            <a:spAutoFit/>
+          </a:bodyPr>
+          <a:lstStyle/>
+          <a:p>
+            <a:r>
+              <a:rPr lang="en-US" altLang="ko-KR" dirty="0"/>
+              <a:t>b</a:t>
+            </a:r>
+            <a:endParaRPr lang="ko-KR" altLang="en-US" dirty="0"/>
+          </a:p>
+        </p:txBody>
+      </p:sp>
+      <p:sp>
+        <p:nvSpPr>
+          <p:cNvPr id="32" name="TextBox 31"/>
+          <p:cNvSpPr txBox="1"/>
+          <p:nvPr/>
+        </p:nvSpPr>
+        <p:spPr>
+          <a:xfrm>
+            <a:off x="7458418" y="5008044"/>
+            <a:ext cx="354584" cy="369332"/>
+          </a:xfrm>
+          <a:prstGeom prst="rect">
+            <a:avLst/>
+          </a:prstGeom>
+          <a:noFill/>
+        </p:spPr>
+        <p:txBody>
+          <a:bodyPr wrap="none" rtlCol="0">
+            <a:spAutoFit/>
+          </a:bodyPr>
+          <a:lstStyle/>
+          <a:p>
+            <a:r>
+              <a:rPr lang="en-US" altLang="ko-KR" dirty="0" smtClean="0"/>
+              <a:t>w</a:t>
+            </a:r>
+            <a:endParaRPr lang="ko-KR" altLang="en-US" dirty="0"/>
+          </a:p>
+        </p:txBody>
+      </p:sp>
+      <p:sp>
+        <p:nvSpPr>
+          <p:cNvPr id="33" name="TextBox 32"/>
+          <p:cNvSpPr txBox="1"/>
+          <p:nvPr/>
+        </p:nvSpPr>
+        <p:spPr>
+          <a:xfrm>
+            <a:off x="9749132" y="5012028"/>
+            <a:ext cx="388248" cy="369332"/>
+          </a:xfrm>
+          <a:prstGeom prst="rect">
+            <a:avLst/>
+          </a:prstGeom>
+          <a:noFill/>
+        </p:spPr>
+        <p:txBody>
+          <a:bodyPr wrap="none" rtlCol="0">
+            <a:spAutoFit/>
+          </a:bodyPr>
+          <a:lstStyle/>
+          <a:p>
+            <a:r>
+              <a:rPr lang="en-US" altLang="ko-KR" dirty="0"/>
+              <a:t>m</a:t>
+            </a:r>
+            <a:endParaRPr lang="ko-KR" altLang="en-US" dirty="0"/>
+          </a:p>
+        </p:txBody>
+      </p:sp>
+      <p:cxnSp>
+        <p:nvCxnSpPr>
+          <p:cNvPr id="35" name="직선 화살표 연결선 34"/>
+          <p:cNvCxnSpPr/>
+          <p:nvPr/>
+        </p:nvCxnSpPr>
+        <p:spPr>
+          <a:xfrm>
+            <a:off x="1140643" y="626881"/>
+            <a:ext cx="9747315" cy="0"/>
+          </a:xfrm>
+          <a:prstGeom prst="straightConnector1">
+            <a:avLst/>
+          </a:prstGeom>
+          <a:ln w="28575">
+            <a:solidFill>
+              <a:schemeClr val="tx1"/>
+            </a:solidFill>
+            <a:headEnd type="triangle"/>
+            <a:tailEnd type="triangle"/>
+          </a:ln>
+        </p:spPr>
+        <p:style>
+          <a:lnRef idx="1">
+            <a:schemeClr val="accent1"/>
+          </a:lnRef>
+          <a:fillRef idx="0">
+            <a:schemeClr val="accent1"/>
+          </a:fillRef>
+          <a:effectRef idx="0">
+            <a:schemeClr val="accent1"/>
+          </a:effectRef>
+          <a:fontRef idx="minor">
+            <a:schemeClr val="tx1"/>
+          </a:fontRef>
+        </p:style>
+      </p:cxnSp>
+      <p:sp>
+        <p:nvSpPr>
+          <p:cNvPr id="37" name="TextBox 36"/>
+          <p:cNvSpPr txBox="1"/>
+          <p:nvPr/>
+        </p:nvSpPr>
+        <p:spPr>
+          <a:xfrm>
+            <a:off x="5762134" y="188363"/>
+            <a:ext cx="813043" cy="369332"/>
+          </a:xfrm>
+          <a:prstGeom prst="rect">
+            <a:avLst/>
+          </a:prstGeom>
+          <a:noFill/>
+        </p:spPr>
+        <p:txBody>
+          <a:bodyPr wrap="none" rtlCol="0">
+            <a:spAutoFit/>
+          </a:bodyPr>
+          <a:lstStyle/>
+          <a:p>
+            <a:r>
+              <a:rPr lang="en-US" altLang="ko-KR" dirty="0" smtClean="0"/>
+              <a:t>Width</a:t>
+            </a:r>
+            <a:endParaRPr lang="ko-KR" altLang="en-US" dirty="0"/>
+          </a:p>
+        </p:txBody>
+      </p:sp>
+      <p:sp>
+        <p:nvSpPr>
+          <p:cNvPr id="38" name="직사각형 37"/>
+          <p:cNvSpPr/>
+          <p:nvPr/>
+        </p:nvSpPr>
+        <p:spPr>
+          <a:xfrm>
+            <a:off x="2003196" y="5008044"/>
+            <a:ext cx="4774676" cy="1348032"/>
+          </a:xfrm>
+          <a:prstGeom prst="rect">
+            <a:avLst/>
+          </a:prstGeom>
+          <a:solidFill>
+            <a:schemeClr val="accent6">
+              <a:lumMod val="40000"/>
+              <a:lumOff val="60000"/>
+            </a:schemeClr>
+          </a:solidFill>
+        </p:spPr>
+        <p:style>
+          <a:lnRef idx="2">
+            <a:schemeClr val="accent1">
+              <a:shade val="50000"/>
+            </a:schemeClr>
+          </a:lnRef>
+          <a:fillRef idx="1">
+            <a:schemeClr val="accent1"/>
+          </a:fillRef>
+          <a:effectRef idx="0">
+            <a:schemeClr val="accent1"/>
+          </a:effectRef>
+          <a:fontRef idx="minor">
+            <a:schemeClr val="lt1"/>
+          </a:fontRef>
+        </p:style>
+        <p:txBody>
+          <a:bodyPr rtlCol="0" anchor="ctr"/>
+          <a:lstStyle/>
+          <a:p>
+            <a:pPr algn="ctr"/>
+            <a:r>
+              <a:rPr lang="en-US" altLang="ko-KR" sz="2400" dirty="0" smtClean="0">
+                <a:solidFill>
+                  <a:schemeClr val="tx1"/>
+                </a:solidFill>
+              </a:rPr>
+              <a:t>Width = 2b + 2nm + </a:t>
+            </a:r>
+            <a:r>
+              <a:rPr lang="en-US" altLang="ko-KR" sz="2400" dirty="0" err="1" smtClean="0">
+                <a:solidFill>
+                  <a:schemeClr val="tx1"/>
+                </a:solidFill>
+              </a:rPr>
+              <a:t>nw</a:t>
+            </a:r>
+            <a:endParaRPr lang="en-US" altLang="ko-KR" sz="2400" dirty="0" smtClean="0">
+              <a:solidFill>
+                <a:schemeClr val="tx1"/>
+              </a:solidFill>
+            </a:endParaRPr>
+          </a:p>
+          <a:p>
+            <a:pPr algn="ctr"/>
+            <a:r>
+              <a:rPr lang="en-US" altLang="ko-KR" sz="2400" dirty="0" err="1" smtClean="0">
+                <a:solidFill>
+                  <a:schemeClr val="tx1"/>
+                </a:solidFill>
+              </a:rPr>
+              <a:t>nw</a:t>
+            </a:r>
+            <a:r>
+              <a:rPr lang="en-US" altLang="ko-KR" sz="2400" dirty="0" smtClean="0">
+                <a:solidFill>
+                  <a:schemeClr val="tx1"/>
+                </a:solidFill>
+              </a:rPr>
+              <a:t> = Width -2b -2nm</a:t>
+            </a:r>
+          </a:p>
+          <a:p>
+            <a:pPr algn="ctr"/>
+            <a:r>
+              <a:rPr lang="en-US" altLang="ko-KR" sz="2400" dirty="0" smtClean="0">
+                <a:solidFill>
+                  <a:schemeClr val="tx1"/>
+                </a:solidFill>
+              </a:rPr>
+              <a:t>w = (W-2b)/n  - 2m</a:t>
+            </a:r>
+            <a:endParaRPr lang="ko-KR" altLang="en-US" sz="2400" dirty="0">
+              <a:solidFill>
+                <a:schemeClr val="tx1"/>
+              </a:solidFill>
+            </a:endParaRPr>
+          </a:p>
+        </p:txBody>
+      </p:sp>
+      <p:sp>
+        <p:nvSpPr>
+          <p:cNvPr id="39" name="직사각형 38"/>
+          <p:cNvSpPr/>
+          <p:nvPr/>
+        </p:nvSpPr>
+        <p:spPr>
+          <a:xfrm>
+            <a:off x="82484" y="42786"/>
+            <a:ext cx="4432955" cy="458406"/>
+          </a:xfrm>
+          <a:prstGeom prst="rect">
+            <a:avLst/>
+          </a:prstGeom>
+        </p:spPr>
+        <p:style>
+          <a:lnRef idx="2">
+            <a:schemeClr val="dk1">
+              <a:shade val="50000"/>
+            </a:schemeClr>
+          </a:lnRef>
+          <a:fillRef idx="1">
+            <a:schemeClr val="dk1"/>
+          </a:fillRef>
+          <a:effectRef idx="0">
+            <a:schemeClr val="dk1"/>
+          </a:effectRef>
+          <a:fontRef idx="minor">
+            <a:schemeClr val="lt1"/>
+          </a:fontRef>
+        </p:style>
+        <p:txBody>
+          <a:bodyPr rtlCol="0" anchor="ctr"/>
+          <a:lstStyle/>
+          <a:p>
+            <a:pPr algn="ctr"/>
+            <a:r>
+              <a:rPr lang="en-US" altLang="ko-KR" sz="1400" dirty="0" smtClean="0"/>
+              <a:t>Note</a:t>
+            </a:r>
+            <a:r>
+              <a:rPr lang="ko-KR" altLang="en-US" sz="1400" dirty="0" smtClean="0"/>
+              <a:t>의 </a:t>
+            </a:r>
+            <a:r>
+              <a:rPr lang="en-US" altLang="ko-KR" sz="1400" dirty="0" smtClean="0"/>
+              <a:t>Width </a:t>
+            </a:r>
+            <a:r>
+              <a:rPr lang="ko-KR" altLang="en-US" sz="1400" dirty="0" smtClean="0"/>
+              <a:t>구하기</a:t>
+            </a:r>
+            <a:endParaRPr lang="ko-KR" altLang="en-US" sz="1400" dirty="0"/>
+          </a:p>
+        </p:txBody>
+      </p:sp>
+    </p:spTree>
+    <p:extLst>
+      <p:ext uri="{BB962C8B-B14F-4D97-AF65-F5344CB8AC3E}">
+        <p14:creationId xmlns:p14="http://schemas.microsoft.com/office/powerpoint/2010/main" val="1871015718"/>
       </p:ext>
     </p:extLst>
   </p:cSld>

</xml_diff>